<commit_message>
Modified & final edition
</commit_message>
<xml_diff>
--- a/Program Slicing.pptx
+++ b/Program Slicing.pptx
@@ -13,8 +13,10 @@
     <p:sldId id="262" r:id="rId7"/>
     <p:sldId id="263" r:id="rId8"/>
     <p:sldId id="264" r:id="rId9"/>
-    <p:sldId id="265" r:id="rId10"/>
-    <p:sldId id="266" r:id="rId11"/>
+    <p:sldId id="267" r:id="rId10"/>
+    <p:sldId id="268" r:id="rId11"/>
+    <p:sldId id="265" r:id="rId12"/>
+    <p:sldId id="266" r:id="rId13"/>
   </p:sldIdLst>
   <p:sldSz cx="12192000" cy="6858000"/>
   <p:notesSz cx="6858000" cy="9144000"/>
@@ -113,6 +115,11 @@
       </a:defRPr>
     </a:lvl9pPr>
   </p:defaultTextStyle>
+  <p:extLst>
+    <p:ext uri="{EFAFB233-063F-42B5-8137-9DF3F51BA10A}">
+      <p15:sldGuideLst xmlns:p15="http://schemas.microsoft.com/office/powerpoint/2012/main"/>
+    </p:ext>
+  </p:extLst>
 </p:presentation>
 </file>
 
@@ -448,7 +455,7 @@
             <a:fld id="{B61BEF0D-F0BB-DE4B-95CE-6DB70DBA9567}" type="datetimeFigureOut">
               <a:rPr lang="en-US" dirty="0"/>
               <a:pPr/>
-              <a:t>3/12/2019</a:t>
+              <a:t>3/13/2019</a:t>
             </a:fld>
             <a:endParaRPr lang="en-US" dirty="0"/>
           </a:p>
@@ -769,7 +776,7 @@
             <a:fld id="{B61BEF0D-F0BB-DE4B-95CE-6DB70DBA9567}" type="datetimeFigureOut">
               <a:rPr lang="en-US" dirty="0"/>
               <a:pPr/>
-              <a:t>3/12/2019</a:t>
+              <a:t>3/13/2019</a:t>
             </a:fld>
             <a:endParaRPr lang="en-US" dirty="0"/>
           </a:p>
@@ -1014,7 +1021,7 @@
             <a:fld id="{B61BEF0D-F0BB-DE4B-95CE-6DB70DBA9567}" type="datetimeFigureOut">
               <a:rPr lang="en-US" dirty="0"/>
               <a:pPr/>
-              <a:t>3/12/2019</a:t>
+              <a:t>3/13/2019</a:t>
             </a:fld>
             <a:endParaRPr lang="en-US" dirty="0"/>
           </a:p>
@@ -1350,7 +1357,7 @@
             <a:fld id="{B61BEF0D-F0BB-DE4B-95CE-6DB70DBA9567}" type="datetimeFigureOut">
               <a:rPr lang="en-US" dirty="0"/>
               <a:pPr/>
-              <a:t>3/12/2019</a:t>
+              <a:t>3/13/2019</a:t>
             </a:fld>
             <a:endParaRPr lang="en-US" dirty="0"/>
           </a:p>
@@ -1694,7 +1701,7 @@
             <a:fld id="{B61BEF0D-F0BB-DE4B-95CE-6DB70DBA9567}" type="datetimeFigureOut">
               <a:rPr lang="en-US" dirty="0"/>
               <a:pPr/>
-              <a:t>3/12/2019</a:t>
+              <a:t>3/13/2019</a:t>
             </a:fld>
             <a:endParaRPr lang="en-US" dirty="0"/>
           </a:p>
@@ -2065,7 +2072,7 @@
             <a:fld id="{B61BEF0D-F0BB-DE4B-95CE-6DB70DBA9567}" type="datetimeFigureOut">
               <a:rPr lang="en-US" dirty="0"/>
               <a:pPr/>
-              <a:t>3/12/2019</a:t>
+              <a:t>3/13/2019</a:t>
             </a:fld>
             <a:endParaRPr lang="en-US" dirty="0"/>
           </a:p>
@@ -2532,7 +2539,7 @@
             <a:fld id="{B61BEF0D-F0BB-DE4B-95CE-6DB70DBA9567}" type="datetimeFigureOut">
               <a:rPr lang="en-US" dirty="0"/>
               <a:pPr/>
-              <a:t>3/12/2019</a:t>
+              <a:t>3/13/2019</a:t>
             </a:fld>
             <a:endParaRPr lang="en-US" dirty="0"/>
           </a:p>
@@ -2734,7 +2741,7 @@
             <a:fld id="{B61BEF0D-F0BB-DE4B-95CE-6DB70DBA9567}" type="datetimeFigureOut">
               <a:rPr lang="en-US" dirty="0"/>
               <a:pPr/>
-              <a:t>3/12/2019</a:t>
+              <a:t>3/13/2019</a:t>
             </a:fld>
             <a:endParaRPr lang="en-US" dirty="0"/>
           </a:p>
@@ -2942,7 +2949,7 @@
             <a:fld id="{B61BEF0D-F0BB-DE4B-95CE-6DB70DBA9567}" type="datetimeFigureOut">
               <a:rPr lang="en-US" dirty="0"/>
               <a:pPr/>
-              <a:t>3/12/2019</a:t>
+              <a:t>3/13/2019</a:t>
             </a:fld>
             <a:endParaRPr lang="en-US" dirty="0"/>
           </a:p>
@@ -3170,7 +3177,7 @@
           <a:p>
             <a:fld id="{52647F38-B617-4D2F-AE0A-013F0C4D2C57}" type="datetimeFigureOut">
               <a:rPr lang="en-US" dirty="0"/>
-              <a:t>3/12/2019</a:t>
+              <a:t>3/13/2019</a:t>
             </a:fld>
             <a:endParaRPr lang="en-US" dirty="0"/>
           </a:p>
@@ -3414,7 +3421,7 @@
             <a:fld id="{B61BEF0D-F0BB-DE4B-95CE-6DB70DBA9567}" type="datetimeFigureOut">
               <a:rPr lang="en-US" dirty="0"/>
               <a:pPr/>
-              <a:t>3/12/2019</a:t>
+              <a:t>3/13/2019</a:t>
             </a:fld>
             <a:endParaRPr lang="en-US" dirty="0"/>
           </a:p>
@@ -3708,7 +3715,7 @@
           <a:p>
             <a:fld id="{05BFA754-D5C3-4E66-96A6-867B257F58DC}" type="datetimeFigureOut">
               <a:rPr lang="en-US" dirty="0"/>
-              <a:t>3/12/2019</a:t>
+              <a:t>3/13/2019</a:t>
             </a:fld>
             <a:endParaRPr lang="en-US" dirty="0"/>
           </a:p>
@@ -4098,7 +4105,7 @@
             <a:fld id="{B61BEF0D-F0BB-DE4B-95CE-6DB70DBA9567}" type="datetimeFigureOut">
               <a:rPr lang="en-US" dirty="0"/>
               <a:pPr/>
-              <a:t>3/12/2019</a:t>
+              <a:t>3/13/2019</a:t>
             </a:fld>
             <a:endParaRPr lang="en-US" dirty="0"/>
           </a:p>
@@ -4244,7 +4251,7 @@
             <a:fld id="{B61BEF0D-F0BB-DE4B-95CE-6DB70DBA9567}" type="datetimeFigureOut">
               <a:rPr lang="en-US" dirty="0"/>
               <a:pPr/>
-              <a:t>3/12/2019</a:t>
+              <a:t>3/13/2019</a:t>
             </a:fld>
             <a:endParaRPr lang="en-US" dirty="0"/>
           </a:p>
@@ -4367,7 +4374,7 @@
             <a:fld id="{B61BEF0D-F0BB-DE4B-95CE-6DB70DBA9567}" type="datetimeFigureOut">
               <a:rPr lang="en-US" dirty="0"/>
               <a:pPr/>
-              <a:t>3/12/2019</a:t>
+              <a:t>3/13/2019</a:t>
             </a:fld>
             <a:endParaRPr lang="en-US" dirty="0"/>
           </a:p>
@@ -4619,7 +4626,7 @@
             <a:fld id="{B61BEF0D-F0BB-DE4B-95CE-6DB70DBA9567}" type="datetimeFigureOut">
               <a:rPr lang="en-US" dirty="0"/>
               <a:pPr/>
-              <a:t>3/12/2019</a:t>
+              <a:t>3/13/2019</a:t>
             </a:fld>
             <a:endParaRPr lang="en-US" dirty="0"/>
           </a:p>
@@ -4931,7 +4938,7 @@
             <a:fld id="{B61BEF0D-F0BB-DE4B-95CE-6DB70DBA9567}" type="datetimeFigureOut">
               <a:rPr lang="en-US" dirty="0"/>
               <a:pPr/>
-              <a:t>3/12/2019</a:t>
+              <a:t>3/13/2019</a:t>
             </a:fld>
             <a:endParaRPr lang="en-US" dirty="0"/>
           </a:p>
@@ -5279,7 +5286,7 @@
             <a:fld id="{B61BEF0D-F0BB-DE4B-95CE-6DB70DBA9567}" type="datetimeFigureOut">
               <a:rPr lang="en-US" dirty="0"/>
               <a:pPr/>
-              <a:t>3/12/2019</a:t>
+              <a:t>3/13/2019</a:t>
             </a:fld>
             <a:endParaRPr lang="en-US" dirty="0"/>
           </a:p>
@@ -5835,14 +5842,14 @@
           <a:p>
             <a:r>
               <a:rPr lang="en-US" dirty="0" smtClean="0">
-                <a:latin typeface="Tahoma" panose="020B0604030504040204" pitchFamily="34" charset="0"/>
+                <a:latin typeface="Sitka Subheading" panose="02000505000000020004" pitchFamily="2" charset="0"/>
                 <a:ea typeface="Tahoma" panose="020B0604030504040204" pitchFamily="34" charset="0"/>
                 <a:cs typeface="Tahoma" panose="020B0604030504040204" pitchFamily="34" charset="0"/>
               </a:rPr>
               <a:t>Program Slicing</a:t>
             </a:r>
             <a:endParaRPr lang="en-US" dirty="0">
-              <a:latin typeface="Tahoma" panose="020B0604030504040204" pitchFamily="34" charset="0"/>
+              <a:latin typeface="Sitka Subheading" panose="02000505000000020004" pitchFamily="2" charset="0"/>
               <a:ea typeface="Tahoma" panose="020B0604030504040204" pitchFamily="34" charset="0"/>
               <a:cs typeface="Tahoma" panose="020B0604030504040204" pitchFamily="34" charset="0"/>
             </a:endParaRPr>
@@ -5991,6 +5998,570 @@
         </p:nvSpPr>
         <p:spPr/>
         <p:txBody>
+          <a:bodyPr>
+            <a:normAutofit fontScale="90000"/>
+          </a:bodyPr>
+          <a:lstStyle/>
+          <a:p>
+            <a:r>
+              <a:rPr lang="en-US" dirty="0" smtClean="0">
+                <a:latin typeface="Times New Roman" panose="02020603050405020304" pitchFamily="18" charset="0"/>
+                <a:cs typeface="Times New Roman" panose="02020603050405020304" pitchFamily="18" charset="0"/>
+              </a:rPr>
+              <a:t>Another example</a:t>
+            </a:r>
+            <a:br>
+              <a:rPr lang="en-US" dirty="0" smtClean="0">
+                <a:latin typeface="Times New Roman" panose="02020603050405020304" pitchFamily="18" charset="0"/>
+                <a:cs typeface="Times New Roman" panose="02020603050405020304" pitchFamily="18" charset="0"/>
+              </a:rPr>
+            </a:br>
+            <a:r>
+              <a:rPr lang="en-US" sz="3600" dirty="0" smtClean="0">
+                <a:latin typeface="Times New Roman" panose="02020603050405020304" pitchFamily="18" charset="0"/>
+                <a:cs typeface="Times New Roman" panose="02020603050405020304" pitchFamily="18" charset="0"/>
+              </a:rPr>
+              <a:t>Slicing criterion &lt;3,num1&gt;</a:t>
+            </a:r>
+            <a:br>
+              <a:rPr lang="en-US" sz="3600" dirty="0" smtClean="0">
+                <a:latin typeface="Times New Roman" panose="02020603050405020304" pitchFamily="18" charset="0"/>
+                <a:cs typeface="Times New Roman" panose="02020603050405020304" pitchFamily="18" charset="0"/>
+              </a:rPr>
+            </a:br>
+            <a:endParaRPr lang="en-US" sz="3600" dirty="0">
+              <a:latin typeface="Times New Roman" panose="02020603050405020304" pitchFamily="18" charset="0"/>
+              <a:cs typeface="Times New Roman" panose="02020603050405020304" pitchFamily="18" charset="0"/>
+            </a:endParaRPr>
+          </a:p>
+        </p:txBody>
+      </p:sp>
+      <p:pic>
+        <p:nvPicPr>
+          <p:cNvPr id="4" name="Content Placeholder 3"/>
+          <p:cNvPicPr>
+            <a:picLocks noGrp="1" noChangeAspect="1"/>
+          </p:cNvPicPr>
+          <p:nvPr>
+            <p:ph idx="1"/>
+          </p:nvPr>
+        </p:nvPicPr>
+        <p:blipFill>
+          <a:blip r:embed="rId2">
+            <a:extLst>
+              <a:ext uri="{28A0092B-C50C-407E-A947-70E740481C1C}">
+                <a14:useLocalDpi xmlns:a14="http://schemas.microsoft.com/office/drawing/2010/main" val="0"/>
+              </a:ext>
+            </a:extLst>
+          </a:blip>
+          <a:stretch>
+            <a:fillRect/>
+          </a:stretch>
+        </p:blipFill>
+        <p:spPr>
+          <a:xfrm>
+            <a:off x="0" y="2046061"/>
+            <a:ext cx="7136635" cy="4633559"/>
+          </a:xfrm>
+        </p:spPr>
+      </p:pic>
+      <p:pic>
+        <p:nvPicPr>
+          <p:cNvPr id="5" name="Picture 4"/>
+          <p:cNvPicPr>
+            <a:picLocks noChangeAspect="1"/>
+          </p:cNvPicPr>
+          <p:nvPr/>
+        </p:nvPicPr>
+        <p:blipFill>
+          <a:blip r:embed="rId3">
+            <a:extLst>
+              <a:ext uri="{28A0092B-C50C-407E-A947-70E740481C1C}">
+                <a14:useLocalDpi xmlns:a14="http://schemas.microsoft.com/office/drawing/2010/main" val="0"/>
+              </a:ext>
+            </a:extLst>
+          </a:blip>
+          <a:stretch>
+            <a:fillRect/>
+          </a:stretch>
+        </p:blipFill>
+        <p:spPr>
+          <a:xfrm>
+            <a:off x="6364382" y="2846872"/>
+            <a:ext cx="5827618" cy="4564345"/>
+          </a:xfrm>
+          <a:prstGeom prst="rect">
+            <a:avLst/>
+          </a:prstGeom>
+        </p:spPr>
+      </p:pic>
+    </p:spTree>
+    <p:extLst>
+      <p:ext uri="{BB962C8B-B14F-4D97-AF65-F5344CB8AC3E}">
+        <p14:creationId xmlns:p14="http://schemas.microsoft.com/office/powerpoint/2010/main" val="2256088014"/>
+      </p:ext>
+    </p:extLst>
+  </p:cSld>
+  <p:clrMapOvr>
+    <a:masterClrMapping/>
+  </p:clrMapOvr>
+</p:sld>
+</file>
+
+<file path=ppt/slides/slide11.xml><?xml version="1.0" encoding="utf-8"?>
+<p:sld xmlns:a="http://schemas.openxmlformats.org/drawingml/2006/main" xmlns:r="http://schemas.openxmlformats.org/officeDocument/2006/relationships" xmlns:p="http://schemas.openxmlformats.org/presentationml/2006/main">
+  <p:cSld>
+    <p:spTree>
+      <p:nvGrpSpPr>
+        <p:cNvPr id="1" name=""/>
+        <p:cNvGrpSpPr/>
+        <p:nvPr/>
+      </p:nvGrpSpPr>
+      <p:grpSpPr>
+        <a:xfrm>
+          <a:off x="0" y="0"/>
+          <a:ext cx="0" cy="0"/>
+          <a:chOff x="0" y="0"/>
+          <a:chExt cx="0" cy="0"/>
+        </a:xfrm>
+      </p:grpSpPr>
+      <p:sp>
+        <p:nvSpPr>
+          <p:cNvPr id="2" name="Title 1"/>
+          <p:cNvSpPr>
+            <a:spLocks noGrp="1"/>
+          </p:cNvSpPr>
+          <p:nvPr>
+            <p:ph type="title"/>
+          </p:nvPr>
+        </p:nvSpPr>
+        <p:spPr/>
+        <p:txBody>
+          <a:bodyPr/>
+          <a:lstStyle/>
+          <a:p>
+            <a:r>
+              <a:rPr lang="en-US" dirty="0" smtClean="0">
+                <a:latin typeface="Times New Roman" panose="02020603050405020304" pitchFamily="18" charset="0"/>
+                <a:cs typeface="Times New Roman" panose="02020603050405020304" pitchFamily="18" charset="0"/>
+              </a:rPr>
+              <a:t>References</a:t>
+            </a:r>
+            <a:endParaRPr lang="en-US" dirty="0">
+              <a:latin typeface="Times New Roman" panose="02020603050405020304" pitchFamily="18" charset="0"/>
+              <a:cs typeface="Times New Roman" panose="02020603050405020304" pitchFamily="18" charset="0"/>
+            </a:endParaRPr>
+          </a:p>
+        </p:txBody>
+      </p:sp>
+      <p:sp>
+        <p:nvSpPr>
+          <p:cNvPr id="3" name="Content Placeholder 2"/>
+          <p:cNvSpPr>
+            <a:spLocks noGrp="1"/>
+          </p:cNvSpPr>
+          <p:nvPr>
+            <p:ph idx="1"/>
+          </p:nvPr>
+        </p:nvSpPr>
+        <p:spPr/>
+        <p:txBody>
+          <a:bodyPr>
+            <a:normAutofit fontScale="92500"/>
+            <a:scene3d>
+              <a:camera prst="orthographicFront"/>
+              <a:lightRig rig="harsh" dir="t"/>
+            </a:scene3d>
+            <a:sp3d extrusionH="57150" prstMaterial="matte">
+              <a:bevelT w="63500" h="12700" prst="angle"/>
+              <a:contourClr>
+                <a:schemeClr val="bg1">
+                  <a:lumMod val="65000"/>
+                </a:schemeClr>
+              </a:contourClr>
+            </a:sp3d>
+          </a:bodyPr>
+          <a:lstStyle/>
+          <a:p>
+            <a:endParaRPr lang="en-US" b="1" dirty="0" smtClean="0">
+              <a:ln/>
+              <a:solidFill>
+                <a:schemeClr val="accent3"/>
+              </a:solidFill>
+            </a:endParaRPr>
+          </a:p>
+          <a:p>
+            <a:r>
+              <a:rPr lang="en-US" b="1" dirty="0">
+                <a:ln w="9525">
+                  <a:solidFill>
+                    <a:schemeClr val="bg1"/>
+                  </a:solidFill>
+                  <a:prstDash val="solid"/>
+                </a:ln>
+                <a:solidFill>
+                  <a:schemeClr val="tx1"/>
+                </a:solidFill>
+                <a:effectLst>
+                  <a:outerShdw blurRad="12700" dist="38100" dir="2700000" algn="tl" rotWithShape="0">
+                    <a:schemeClr val="bg1">
+                      <a:lumMod val="50000"/>
+                    </a:schemeClr>
+                  </a:outerShdw>
+                </a:effectLst>
+                <a:hlinkClick r:id="rId2"/>
+              </a:rPr>
+              <a:t>https://</a:t>
+            </a:r>
+            <a:r>
+              <a:rPr lang="en-US" b="1" dirty="0" smtClean="0">
+                <a:ln w="9525">
+                  <a:solidFill>
+                    <a:schemeClr val="bg1"/>
+                  </a:solidFill>
+                  <a:prstDash val="solid"/>
+                </a:ln>
+                <a:solidFill>
+                  <a:schemeClr val="tx1"/>
+                </a:solidFill>
+                <a:effectLst>
+                  <a:outerShdw blurRad="12700" dist="38100" dir="2700000" algn="tl" rotWithShape="0">
+                    <a:schemeClr val="bg1">
+                      <a:lumMod val="50000"/>
+                    </a:schemeClr>
+                  </a:outerShdw>
+                </a:effectLst>
+                <a:hlinkClick r:id="rId2"/>
+              </a:rPr>
+              <a:t>en.wikipedia.org/wiki/Program_slicing</a:t>
+            </a:r>
+            <a:endParaRPr lang="en-US" b="1" dirty="0" smtClean="0">
+              <a:ln w="9525">
+                <a:solidFill>
+                  <a:schemeClr val="bg1"/>
+                </a:solidFill>
+                <a:prstDash val="solid"/>
+              </a:ln>
+              <a:solidFill>
+                <a:schemeClr val="tx1"/>
+              </a:solidFill>
+              <a:effectLst>
+                <a:outerShdw blurRad="12700" dist="38100" dir="2700000" algn="tl" rotWithShape="0">
+                  <a:schemeClr val="bg1">
+                    <a:lumMod val="50000"/>
+                  </a:schemeClr>
+                </a:outerShdw>
+              </a:effectLst>
+            </a:endParaRPr>
+          </a:p>
+          <a:p>
+            <a:r>
+              <a:rPr lang="en-US" b="1" dirty="0">
+                <a:ln w="9525">
+                  <a:solidFill>
+                    <a:schemeClr val="bg1"/>
+                  </a:solidFill>
+                  <a:prstDash val="solid"/>
+                </a:ln>
+                <a:solidFill>
+                  <a:schemeClr val="tx1"/>
+                </a:solidFill>
+                <a:effectLst>
+                  <a:outerShdw blurRad="12700" dist="38100" dir="2700000" algn="tl" rotWithShape="0">
+                    <a:schemeClr val="bg1">
+                      <a:lumMod val="50000"/>
+                    </a:schemeClr>
+                  </a:outerShdw>
+                </a:effectLst>
+                <a:hlinkClick r:id="rId3"/>
+              </a:rPr>
+              <a:t>http://</a:t>
+            </a:r>
+            <a:r>
+              <a:rPr lang="en-US" b="1" dirty="0" smtClean="0">
+                <a:ln w="9525">
+                  <a:solidFill>
+                    <a:schemeClr val="bg1"/>
+                  </a:solidFill>
+                  <a:prstDash val="solid"/>
+                </a:ln>
+                <a:solidFill>
+                  <a:schemeClr val="tx1"/>
+                </a:solidFill>
+                <a:effectLst>
+                  <a:outerShdw blurRad="12700" dist="38100" dir="2700000" algn="tl" rotWithShape="0">
+                    <a:schemeClr val="bg1">
+                      <a:lumMod val="50000"/>
+                    </a:schemeClr>
+                  </a:outerShdw>
+                </a:effectLst>
+                <a:hlinkClick r:id="rId3"/>
+              </a:rPr>
+              <a:t>www0.cs.ucl.ac.uk/staff/M.Harman/exe1.html</a:t>
+            </a:r>
+            <a:endParaRPr lang="en-US" b="1" dirty="0" smtClean="0">
+              <a:ln w="9525">
+                <a:solidFill>
+                  <a:schemeClr val="bg1"/>
+                </a:solidFill>
+                <a:prstDash val="solid"/>
+              </a:ln>
+              <a:solidFill>
+                <a:schemeClr val="tx1"/>
+              </a:solidFill>
+              <a:effectLst>
+                <a:outerShdw blurRad="12700" dist="38100" dir="2700000" algn="tl" rotWithShape="0">
+                  <a:schemeClr val="bg1">
+                    <a:lumMod val="50000"/>
+                  </a:schemeClr>
+                </a:outerShdw>
+              </a:effectLst>
+            </a:endParaRPr>
+          </a:p>
+          <a:p>
+            <a:r>
+              <a:rPr lang="en-US" b="1" dirty="0">
+                <a:ln w="9525">
+                  <a:solidFill>
+                    <a:schemeClr val="bg1"/>
+                  </a:solidFill>
+                  <a:prstDash val="solid"/>
+                </a:ln>
+                <a:solidFill>
+                  <a:schemeClr val="tx1"/>
+                </a:solidFill>
+                <a:effectLst>
+                  <a:outerShdw blurRad="12700" dist="38100" dir="2700000" algn="tl" rotWithShape="0">
+                    <a:schemeClr val="bg1">
+                      <a:lumMod val="50000"/>
+                    </a:schemeClr>
+                  </a:outerShdw>
+                </a:effectLst>
+                <a:hlinkClick r:id="rId4"/>
+              </a:rPr>
+              <a:t>https://</a:t>
+            </a:r>
+            <a:r>
+              <a:rPr lang="en-US" b="1" dirty="0" smtClean="0">
+                <a:ln w="9525">
+                  <a:solidFill>
+                    <a:schemeClr val="bg1"/>
+                  </a:solidFill>
+                  <a:prstDash val="solid"/>
+                </a:ln>
+                <a:solidFill>
+                  <a:schemeClr val="tx1"/>
+                </a:solidFill>
+                <a:effectLst>
+                  <a:outerShdw blurRad="12700" dist="38100" dir="2700000" algn="tl" rotWithShape="0">
+                    <a:schemeClr val="bg1">
+                      <a:lumMod val="50000"/>
+                    </a:schemeClr>
+                  </a:outerShdw>
+                </a:effectLst>
+                <a:hlinkClick r:id="rId4"/>
+              </a:rPr>
+              <a:t>www.cs.purdue.edu/homes/xyzhang/spring07/590F-slicing.pdf</a:t>
+            </a:r>
+            <a:endParaRPr lang="en-US" b="1" dirty="0" smtClean="0">
+              <a:ln w="9525">
+                <a:solidFill>
+                  <a:schemeClr val="bg1"/>
+                </a:solidFill>
+                <a:prstDash val="solid"/>
+              </a:ln>
+              <a:solidFill>
+                <a:schemeClr val="tx1"/>
+              </a:solidFill>
+              <a:effectLst>
+                <a:outerShdw blurRad="12700" dist="38100" dir="2700000" algn="tl" rotWithShape="0">
+                  <a:schemeClr val="bg1">
+                    <a:lumMod val="50000"/>
+                  </a:schemeClr>
+                </a:outerShdw>
+              </a:effectLst>
+            </a:endParaRPr>
+          </a:p>
+          <a:p>
+            <a:r>
+              <a:rPr lang="en-US" b="1" dirty="0">
+                <a:ln w="9525">
+                  <a:solidFill>
+                    <a:schemeClr val="bg1"/>
+                  </a:solidFill>
+                  <a:prstDash val="solid"/>
+                </a:ln>
+                <a:solidFill>
+                  <a:schemeClr val="tx1"/>
+                </a:solidFill>
+                <a:effectLst>
+                  <a:outerShdw blurRad="12700" dist="38100" dir="2700000" algn="tl" rotWithShape="0">
+                    <a:schemeClr val="bg1">
+                      <a:lumMod val="50000"/>
+                    </a:schemeClr>
+                  </a:outerShdw>
+                </a:effectLst>
+                <a:hlinkClick r:id="rId5"/>
+              </a:rPr>
+              <a:t>https://www.cc.gatech.edu/~</a:t>
+            </a:r>
+            <a:r>
+              <a:rPr lang="en-US" b="1" dirty="0" smtClean="0">
+                <a:ln w="9525">
+                  <a:solidFill>
+                    <a:schemeClr val="bg1"/>
+                  </a:solidFill>
+                  <a:prstDash val="solid"/>
+                </a:ln>
+                <a:solidFill>
+                  <a:schemeClr val="tx1"/>
+                </a:solidFill>
+                <a:effectLst>
+                  <a:outerShdw blurRad="12700" dist="38100" dir="2700000" algn="tl" rotWithShape="0">
+                    <a:schemeClr val="bg1">
+                      <a:lumMod val="50000"/>
+                    </a:schemeClr>
+                  </a:outerShdw>
+                </a:effectLst>
+                <a:hlinkClick r:id="rId5"/>
+              </a:rPr>
+              <a:t>harrold/6340/cs6340_fall2009/Slides/BasicAnalysis6.pdf</a:t>
+            </a:r>
+            <a:endParaRPr lang="en-US" b="1" dirty="0" smtClean="0">
+              <a:ln w="9525">
+                <a:solidFill>
+                  <a:schemeClr val="bg1"/>
+                </a:solidFill>
+                <a:prstDash val="solid"/>
+              </a:ln>
+              <a:solidFill>
+                <a:schemeClr val="tx1"/>
+              </a:solidFill>
+              <a:effectLst>
+                <a:outerShdw blurRad="12700" dist="38100" dir="2700000" algn="tl" rotWithShape="0">
+                  <a:schemeClr val="bg1">
+                    <a:lumMod val="50000"/>
+                  </a:schemeClr>
+                </a:outerShdw>
+              </a:effectLst>
+            </a:endParaRPr>
+          </a:p>
+          <a:p>
+            <a:r>
+              <a:rPr lang="en-US" b="1" dirty="0">
+                <a:ln w="9525">
+                  <a:solidFill>
+                    <a:schemeClr val="bg1"/>
+                  </a:solidFill>
+                  <a:prstDash val="solid"/>
+                </a:ln>
+                <a:solidFill>
+                  <a:schemeClr val="tx1"/>
+                </a:solidFill>
+                <a:effectLst>
+                  <a:outerShdw blurRad="12700" dist="38100" dir="2700000" algn="tl" rotWithShape="0">
+                    <a:schemeClr val="bg1">
+                      <a:lumMod val="50000"/>
+                    </a:schemeClr>
+                  </a:outerShdw>
+                </a:effectLst>
+                <a:hlinkClick r:id="rId6"/>
+              </a:rPr>
+              <a:t>https://www.cs.drexel.edu/~</a:t>
+            </a:r>
+            <a:r>
+              <a:rPr lang="en-US" b="1" dirty="0" smtClean="0">
+                <a:ln w="9525">
+                  <a:solidFill>
+                    <a:schemeClr val="bg1"/>
+                  </a:solidFill>
+                  <a:prstDash val="solid"/>
+                </a:ln>
+                <a:solidFill>
+                  <a:schemeClr val="tx1"/>
+                </a:solidFill>
+                <a:effectLst>
+                  <a:outerShdw blurRad="12700" dist="38100" dir="2700000" algn="tl" rotWithShape="0">
+                    <a:schemeClr val="bg1">
+                      <a:lumMod val="50000"/>
+                    </a:schemeClr>
+                  </a:outerShdw>
+                </a:effectLst>
+                <a:hlinkClick r:id="rId6"/>
+              </a:rPr>
+              <a:t>spiros/teaching/CS576/slides/5.slicing.pdf</a:t>
+            </a:r>
+            <a:endParaRPr lang="en-US" b="1" dirty="0" smtClean="0">
+              <a:ln w="9525">
+                <a:solidFill>
+                  <a:schemeClr val="bg1"/>
+                </a:solidFill>
+                <a:prstDash val="solid"/>
+              </a:ln>
+              <a:solidFill>
+                <a:schemeClr val="tx1"/>
+              </a:solidFill>
+              <a:effectLst>
+                <a:outerShdw blurRad="12700" dist="38100" dir="2700000" algn="tl" rotWithShape="0">
+                  <a:schemeClr val="bg1">
+                    <a:lumMod val="50000"/>
+                  </a:schemeClr>
+                </a:outerShdw>
+              </a:effectLst>
+            </a:endParaRPr>
+          </a:p>
+          <a:p>
+            <a:endParaRPr lang="en-US" b="1" dirty="0">
+              <a:ln/>
+              <a:solidFill>
+                <a:schemeClr val="accent3"/>
+              </a:solidFill>
+            </a:endParaRPr>
+          </a:p>
+        </p:txBody>
+      </p:sp>
+    </p:spTree>
+    <p:extLst>
+      <p:ext uri="{BB962C8B-B14F-4D97-AF65-F5344CB8AC3E}">
+        <p14:creationId xmlns:p14="http://schemas.microsoft.com/office/powerpoint/2010/main" val="4095579092"/>
+      </p:ext>
+    </p:extLst>
+  </p:cSld>
+  <p:clrMapOvr>
+    <a:masterClrMapping/>
+  </p:clrMapOvr>
+</p:sld>
+</file>
+
+<file path=ppt/slides/slide12.xml><?xml version="1.0" encoding="utf-8"?>
+<p:sld xmlns:a="http://schemas.openxmlformats.org/drawingml/2006/main" xmlns:r="http://schemas.openxmlformats.org/officeDocument/2006/relationships" xmlns:p="http://schemas.openxmlformats.org/presentationml/2006/main">
+  <p:cSld>
+    <p:spTree>
+      <p:nvGrpSpPr>
+        <p:cNvPr id="1" name=""/>
+        <p:cNvGrpSpPr/>
+        <p:nvPr/>
+      </p:nvGrpSpPr>
+      <p:grpSpPr>
+        <a:xfrm>
+          <a:off x="0" y="0"/>
+          <a:ext cx="0" cy="0"/>
+          <a:chOff x="0" y="0"/>
+          <a:chExt cx="0" cy="0"/>
+        </a:xfrm>
+      </p:grpSpPr>
+      <p:sp>
+        <p:nvSpPr>
+          <p:cNvPr id="2" name="Title 1"/>
+          <p:cNvSpPr>
+            <a:spLocks noGrp="1"/>
+          </p:cNvSpPr>
+          <p:nvPr>
+            <p:ph type="title"/>
+          </p:nvPr>
+        </p:nvSpPr>
+        <p:spPr/>
+        <p:txBody>
           <a:bodyPr/>
           <a:lstStyle/>
           <a:p>
@@ -7170,7 +7741,14 @@
                 <a:latin typeface="Times New Roman" panose="02020603050405020304" pitchFamily="18" charset="0"/>
                 <a:cs typeface="Times New Roman" panose="02020603050405020304" pitchFamily="18" charset="0"/>
               </a:rPr>
-              <a:t>What I have done so far?</a:t>
+              <a:t>What I have done so </a:t>
+            </a:r>
+            <a:r>
+              <a:rPr lang="en-US" b="1" dirty="0" smtClean="0">
+                <a:latin typeface="Times New Roman" panose="02020603050405020304" pitchFamily="18" charset="0"/>
+                <a:cs typeface="Times New Roman" panose="02020603050405020304" pitchFamily="18" charset="0"/>
+              </a:rPr>
+              <a:t>far…</a:t>
             </a:r>
             <a:endParaRPr lang="en-US" b="1" dirty="0">
               <a:latin typeface="Times New Roman" panose="02020603050405020304" pitchFamily="18" charset="0"/>
@@ -7334,7 +7912,9 @@
         </p:nvSpPr>
         <p:spPr/>
         <p:txBody>
-          <a:bodyPr/>
+          <a:bodyPr>
+            <a:normAutofit fontScale="90000"/>
+          </a:bodyPr>
           <a:lstStyle/>
           <a:p>
             <a:r>
@@ -7342,385 +7922,91 @@
                 <a:latin typeface="Times New Roman" panose="02020603050405020304" pitchFamily="18" charset="0"/>
                 <a:cs typeface="Times New Roman" panose="02020603050405020304" pitchFamily="18" charset="0"/>
               </a:rPr>
-              <a:t>References</a:t>
-            </a:r>
-            <a:endParaRPr lang="en-US" dirty="0">
+              <a:t>A simple input file &amp; it’s slice</a:t>
+            </a:r>
+            <a:br>
+              <a:rPr lang="en-US" dirty="0" smtClean="0">
+                <a:latin typeface="Times New Roman" panose="02020603050405020304" pitchFamily="18" charset="0"/>
+                <a:cs typeface="Times New Roman" panose="02020603050405020304" pitchFamily="18" charset="0"/>
+              </a:rPr>
+            </a:br>
+            <a:r>
+              <a:rPr lang="en-US" sz="3600" dirty="0" smtClean="0">
+                <a:latin typeface="Times New Roman" panose="02020603050405020304" pitchFamily="18" charset="0"/>
+                <a:cs typeface="Times New Roman" panose="02020603050405020304" pitchFamily="18" charset="0"/>
+              </a:rPr>
+              <a:t>slicing criterion &lt;6,c&gt;</a:t>
+            </a:r>
+            <a:endParaRPr lang="en-US" sz="3600" dirty="0">
               <a:latin typeface="Times New Roman" panose="02020603050405020304" pitchFamily="18" charset="0"/>
               <a:cs typeface="Times New Roman" panose="02020603050405020304" pitchFamily="18" charset="0"/>
             </a:endParaRPr>
           </a:p>
         </p:txBody>
       </p:sp>
-      <p:sp>
-        <p:nvSpPr>
-          <p:cNvPr id="3" name="Content Placeholder 2"/>
-          <p:cNvSpPr>
-            <a:spLocks noGrp="1"/>
-          </p:cNvSpPr>
+      <p:pic>
+        <p:nvPicPr>
+          <p:cNvPr id="4" name="Content Placeholder 3"/>
+          <p:cNvPicPr>
+            <a:picLocks noGrp="1" noChangeAspect="1"/>
+          </p:cNvPicPr>
           <p:nvPr>
             <p:ph idx="1"/>
           </p:nvPr>
-        </p:nvSpPr>
-        <p:spPr/>
-        <p:txBody>
-          <a:bodyPr>
-            <a:normAutofit fontScale="92500"/>
-            <a:scene3d>
-              <a:camera prst="orthographicFront"/>
-              <a:lightRig rig="harsh" dir="t"/>
-            </a:scene3d>
-            <a:sp3d extrusionH="57150" prstMaterial="matte">
-              <a:bevelT w="63500" h="12700" prst="angle"/>
-              <a:contourClr>
-                <a:schemeClr val="bg1">
-                  <a:lumMod val="65000"/>
-                </a:schemeClr>
-              </a:contourClr>
-            </a:sp3d>
-          </a:bodyPr>
-          <a:lstStyle/>
-          <a:p>
-            <a:endParaRPr lang="en-US" b="1" dirty="0" smtClean="0">
-              <a:ln/>
-              <a:solidFill>
-                <a:schemeClr val="accent3"/>
-              </a:solidFill>
-            </a:endParaRPr>
-          </a:p>
-          <a:p>
-            <a:r>
-              <a:rPr lang="en-US" b="1" dirty="0">
-                <a:ln w="9525">
-                  <a:solidFill>
-                    <a:schemeClr val="bg1"/>
-                  </a:solidFill>
-                  <a:prstDash val="solid"/>
-                </a:ln>
-                <a:solidFill>
-                  <a:schemeClr val="tx1"/>
-                </a:solidFill>
-                <a:effectLst>
-                  <a:outerShdw blurRad="12700" dist="38100" dir="2700000" algn="tl" rotWithShape="0">
-                    <a:schemeClr val="bg1">
-                      <a:lumMod val="50000"/>
-                    </a:schemeClr>
-                  </a:outerShdw>
-                </a:effectLst>
-                <a:hlinkClick r:id="rId2"/>
-              </a:rPr>
-              <a:t>https://</a:t>
-            </a:r>
-            <a:r>
-              <a:rPr lang="en-US" b="1" dirty="0" smtClean="0">
-                <a:ln w="9525">
-                  <a:solidFill>
-                    <a:schemeClr val="bg1"/>
-                  </a:solidFill>
-                  <a:prstDash val="solid"/>
-                </a:ln>
-                <a:solidFill>
-                  <a:schemeClr val="tx1"/>
-                </a:solidFill>
-                <a:effectLst>
-                  <a:outerShdw blurRad="12700" dist="38100" dir="2700000" algn="tl" rotWithShape="0">
-                    <a:schemeClr val="bg1">
-                      <a:lumMod val="50000"/>
-                    </a:schemeClr>
-                  </a:outerShdw>
-                </a:effectLst>
-                <a:hlinkClick r:id="rId2"/>
-              </a:rPr>
-              <a:t>en.wikipedia.org/wiki/Program_slicing</a:t>
-            </a:r>
-            <a:endParaRPr lang="en-US" b="1" dirty="0" smtClean="0">
-              <a:ln w="9525">
-                <a:solidFill>
-                  <a:schemeClr val="bg1"/>
-                </a:solidFill>
-                <a:prstDash val="solid"/>
-              </a:ln>
-              <a:solidFill>
-                <a:schemeClr val="tx1"/>
-              </a:solidFill>
-              <a:effectLst>
-                <a:outerShdw blurRad="12700" dist="38100" dir="2700000" algn="tl" rotWithShape="0">
-                  <a:schemeClr val="bg1">
-                    <a:lumMod val="50000"/>
-                  </a:schemeClr>
-                </a:outerShdw>
-              </a:effectLst>
-            </a:endParaRPr>
-          </a:p>
-          <a:p>
-            <a:r>
-              <a:rPr lang="en-US" b="1" dirty="0">
-                <a:ln w="9525">
-                  <a:solidFill>
-                    <a:schemeClr val="bg1"/>
-                  </a:solidFill>
-                  <a:prstDash val="solid"/>
-                </a:ln>
-                <a:solidFill>
-                  <a:schemeClr val="tx1"/>
-                </a:solidFill>
-                <a:effectLst>
-                  <a:outerShdw blurRad="12700" dist="38100" dir="2700000" algn="tl" rotWithShape="0">
-                    <a:schemeClr val="bg1">
-                      <a:lumMod val="50000"/>
-                    </a:schemeClr>
-                  </a:outerShdw>
-                </a:effectLst>
-                <a:hlinkClick r:id="rId3"/>
-              </a:rPr>
-              <a:t>http://</a:t>
-            </a:r>
-            <a:r>
-              <a:rPr lang="en-US" b="1" dirty="0" smtClean="0">
-                <a:ln w="9525">
-                  <a:solidFill>
-                    <a:schemeClr val="bg1"/>
-                  </a:solidFill>
-                  <a:prstDash val="solid"/>
-                </a:ln>
-                <a:solidFill>
-                  <a:schemeClr val="tx1"/>
-                </a:solidFill>
-                <a:effectLst>
-                  <a:outerShdw blurRad="12700" dist="38100" dir="2700000" algn="tl" rotWithShape="0">
-                    <a:schemeClr val="bg1">
-                      <a:lumMod val="50000"/>
-                    </a:schemeClr>
-                  </a:outerShdw>
-                </a:effectLst>
-                <a:hlinkClick r:id="rId3"/>
-              </a:rPr>
-              <a:t>www0.cs.ucl.ac.uk/staff/M.Harman/exe1.html</a:t>
-            </a:r>
-            <a:endParaRPr lang="en-US" b="1" dirty="0" smtClean="0">
-              <a:ln w="9525">
-                <a:solidFill>
-                  <a:schemeClr val="bg1"/>
-                </a:solidFill>
-                <a:prstDash val="solid"/>
-              </a:ln>
-              <a:solidFill>
-                <a:schemeClr val="tx1"/>
-              </a:solidFill>
-              <a:effectLst>
-                <a:outerShdw blurRad="12700" dist="38100" dir="2700000" algn="tl" rotWithShape="0">
-                  <a:schemeClr val="bg1">
-                    <a:lumMod val="50000"/>
-                  </a:schemeClr>
-                </a:outerShdw>
-              </a:effectLst>
-            </a:endParaRPr>
-          </a:p>
-          <a:p>
-            <a:r>
-              <a:rPr lang="en-US" b="1" dirty="0">
-                <a:ln w="9525">
-                  <a:solidFill>
-                    <a:schemeClr val="bg1"/>
-                  </a:solidFill>
-                  <a:prstDash val="solid"/>
-                </a:ln>
-                <a:solidFill>
-                  <a:schemeClr val="tx1"/>
-                </a:solidFill>
-                <a:effectLst>
-                  <a:outerShdw blurRad="12700" dist="38100" dir="2700000" algn="tl" rotWithShape="0">
-                    <a:schemeClr val="bg1">
-                      <a:lumMod val="50000"/>
-                    </a:schemeClr>
-                  </a:outerShdw>
-                </a:effectLst>
-                <a:hlinkClick r:id="rId4"/>
-              </a:rPr>
-              <a:t>https://</a:t>
-            </a:r>
-            <a:r>
-              <a:rPr lang="en-US" b="1" dirty="0" smtClean="0">
-                <a:ln w="9525">
-                  <a:solidFill>
-                    <a:schemeClr val="bg1"/>
-                  </a:solidFill>
-                  <a:prstDash val="solid"/>
-                </a:ln>
-                <a:solidFill>
-                  <a:schemeClr val="tx1"/>
-                </a:solidFill>
-                <a:effectLst>
-                  <a:outerShdw blurRad="12700" dist="38100" dir="2700000" algn="tl" rotWithShape="0">
-                    <a:schemeClr val="bg1">
-                      <a:lumMod val="50000"/>
-                    </a:schemeClr>
-                  </a:outerShdw>
-                </a:effectLst>
-                <a:hlinkClick r:id="rId4"/>
-              </a:rPr>
-              <a:t>www.cs.purdue.edu/homes/xyzhang/spring07/590F-slicing.pdf</a:t>
-            </a:r>
-            <a:endParaRPr lang="en-US" b="1" dirty="0" smtClean="0">
-              <a:ln w="9525">
-                <a:solidFill>
-                  <a:schemeClr val="bg1"/>
-                </a:solidFill>
-                <a:prstDash val="solid"/>
-              </a:ln>
-              <a:solidFill>
-                <a:schemeClr val="tx1"/>
-              </a:solidFill>
-              <a:effectLst>
-                <a:outerShdw blurRad="12700" dist="38100" dir="2700000" algn="tl" rotWithShape="0">
-                  <a:schemeClr val="bg1">
-                    <a:lumMod val="50000"/>
-                  </a:schemeClr>
-                </a:outerShdw>
-              </a:effectLst>
-            </a:endParaRPr>
-          </a:p>
-          <a:p>
-            <a:r>
-              <a:rPr lang="en-US" b="1" dirty="0">
-                <a:ln w="9525">
-                  <a:solidFill>
-                    <a:schemeClr val="bg1"/>
-                  </a:solidFill>
-                  <a:prstDash val="solid"/>
-                </a:ln>
-                <a:solidFill>
-                  <a:schemeClr val="tx1"/>
-                </a:solidFill>
-                <a:effectLst>
-                  <a:outerShdw blurRad="12700" dist="38100" dir="2700000" algn="tl" rotWithShape="0">
-                    <a:schemeClr val="bg1">
-                      <a:lumMod val="50000"/>
-                    </a:schemeClr>
-                  </a:outerShdw>
-                </a:effectLst>
-                <a:hlinkClick r:id="rId5"/>
-              </a:rPr>
-              <a:t>https://www.cc.gatech.edu/~</a:t>
-            </a:r>
-            <a:r>
-              <a:rPr lang="en-US" b="1" dirty="0" smtClean="0">
-                <a:ln w="9525">
-                  <a:solidFill>
-                    <a:schemeClr val="bg1"/>
-                  </a:solidFill>
-                  <a:prstDash val="solid"/>
-                </a:ln>
-                <a:solidFill>
-                  <a:schemeClr val="tx1"/>
-                </a:solidFill>
-                <a:effectLst>
-                  <a:outerShdw blurRad="12700" dist="38100" dir="2700000" algn="tl" rotWithShape="0">
-                    <a:schemeClr val="bg1">
-                      <a:lumMod val="50000"/>
-                    </a:schemeClr>
-                  </a:outerShdw>
-                </a:effectLst>
-                <a:hlinkClick r:id="rId5"/>
-              </a:rPr>
-              <a:t>harrold/6340/cs6340_fall2009/Slides/BasicAnalysis6.pdf</a:t>
-            </a:r>
-            <a:endParaRPr lang="en-US" b="1" dirty="0" smtClean="0">
-              <a:ln w="9525">
-                <a:solidFill>
-                  <a:schemeClr val="bg1"/>
-                </a:solidFill>
-                <a:prstDash val="solid"/>
-              </a:ln>
-              <a:solidFill>
-                <a:schemeClr val="tx1"/>
-              </a:solidFill>
-              <a:effectLst>
-                <a:outerShdw blurRad="12700" dist="38100" dir="2700000" algn="tl" rotWithShape="0">
-                  <a:schemeClr val="bg1">
-                    <a:lumMod val="50000"/>
-                  </a:schemeClr>
-                </a:outerShdw>
-              </a:effectLst>
-            </a:endParaRPr>
-          </a:p>
-          <a:p>
-            <a:r>
-              <a:rPr lang="en-US" b="1" dirty="0">
-                <a:ln w="9525">
-                  <a:solidFill>
-                    <a:schemeClr val="bg1"/>
-                  </a:solidFill>
-                  <a:prstDash val="solid"/>
-                </a:ln>
-                <a:solidFill>
-                  <a:schemeClr val="tx1"/>
-                </a:solidFill>
-                <a:effectLst>
-                  <a:outerShdw blurRad="12700" dist="38100" dir="2700000" algn="tl" rotWithShape="0">
-                    <a:schemeClr val="bg1">
-                      <a:lumMod val="50000"/>
-                    </a:schemeClr>
-                  </a:outerShdw>
-                </a:effectLst>
-                <a:hlinkClick r:id="rId6"/>
-              </a:rPr>
-              <a:t>https://www.cs.drexel.edu/~</a:t>
-            </a:r>
-            <a:r>
-              <a:rPr lang="en-US" b="1" dirty="0" smtClean="0">
-                <a:ln w="9525">
-                  <a:solidFill>
-                    <a:schemeClr val="bg1"/>
-                  </a:solidFill>
-                  <a:prstDash val="solid"/>
-                </a:ln>
-                <a:solidFill>
-                  <a:schemeClr val="tx1"/>
-                </a:solidFill>
-                <a:effectLst>
-                  <a:outerShdw blurRad="12700" dist="38100" dir="2700000" algn="tl" rotWithShape="0">
-                    <a:schemeClr val="bg1">
-                      <a:lumMod val="50000"/>
-                    </a:schemeClr>
-                  </a:outerShdw>
-                </a:effectLst>
-                <a:hlinkClick r:id="rId6"/>
-              </a:rPr>
-              <a:t>spiros/teaching/CS576/slides/5.slicing.pdf</a:t>
-            </a:r>
-            <a:endParaRPr lang="en-US" b="1" dirty="0" smtClean="0">
-              <a:ln w="9525">
-                <a:solidFill>
-                  <a:schemeClr val="bg1"/>
-                </a:solidFill>
-                <a:prstDash val="solid"/>
-              </a:ln>
-              <a:solidFill>
-                <a:schemeClr val="tx1"/>
-              </a:solidFill>
-              <a:effectLst>
-                <a:outerShdw blurRad="12700" dist="38100" dir="2700000" algn="tl" rotWithShape="0">
-                  <a:schemeClr val="bg1">
-                    <a:lumMod val="50000"/>
-                  </a:schemeClr>
-                </a:outerShdw>
-              </a:effectLst>
-            </a:endParaRPr>
-          </a:p>
-          <a:p>
-            <a:endParaRPr lang="en-US" b="1" dirty="0">
-              <a:ln/>
-              <a:solidFill>
-                <a:schemeClr val="accent3"/>
-              </a:solidFill>
-            </a:endParaRPr>
-          </a:p>
-        </p:txBody>
-      </p:sp>
+        </p:nvPicPr>
+        <p:blipFill>
+          <a:blip r:embed="rId2">
+            <a:extLst>
+              <a:ext uri="{28A0092B-C50C-407E-A947-70E740481C1C}">
+                <a14:useLocalDpi xmlns:a14="http://schemas.microsoft.com/office/drawing/2010/main" val="0"/>
+              </a:ext>
+            </a:extLst>
+          </a:blip>
+          <a:stretch>
+            <a:fillRect/>
+          </a:stretch>
+        </p:blipFill>
+        <p:spPr>
+          <a:xfrm>
+            <a:off x="0" y="2734535"/>
+            <a:ext cx="6028760" cy="3611983"/>
+          </a:xfrm>
+        </p:spPr>
+      </p:pic>
+      <p:pic>
+        <p:nvPicPr>
+          <p:cNvPr id="6" name="Picture 5"/>
+          <p:cNvPicPr>
+            <a:picLocks noChangeAspect="1"/>
+          </p:cNvPicPr>
+          <p:nvPr/>
+        </p:nvPicPr>
+        <p:blipFill>
+          <a:blip r:embed="rId3">
+            <a:extLst>
+              <a:ext uri="{28A0092B-C50C-407E-A947-70E740481C1C}">
+                <a14:useLocalDpi xmlns:a14="http://schemas.microsoft.com/office/drawing/2010/main" val="0"/>
+              </a:ext>
+            </a:extLst>
+          </a:blip>
+          <a:stretch>
+            <a:fillRect/>
+          </a:stretch>
+        </p:blipFill>
+        <p:spPr>
+          <a:xfrm>
+            <a:off x="6186311" y="3379205"/>
+            <a:ext cx="5851534" cy="3226958"/>
+          </a:xfrm>
+          <a:prstGeom prst="rect">
+            <a:avLst/>
+          </a:prstGeom>
+        </p:spPr>
+      </p:pic>
     </p:spTree>
     <p:extLst>
       <p:ext uri="{BB962C8B-B14F-4D97-AF65-F5344CB8AC3E}">
-        <p14:creationId xmlns:p14="http://schemas.microsoft.com/office/powerpoint/2010/main" val="4095579092"/>
+        <p14:creationId xmlns:p14="http://schemas.microsoft.com/office/powerpoint/2010/main" val="58633604"/>
       </p:ext>
     </p:extLst>
   </p:cSld>

</xml_diff>